<commit_message>
Made some flow updates
</commit_message>
<xml_diff>
--- a/Docs/PowerShell JEA.pptx
+++ b/Docs/PowerShell JEA.pptx
@@ -619,7 +619,7 @@
           <a:p>
             <a:pPr marL="228334" indent="-226811"/>
             <a:r>
-              <a:rPr lang="en-US" sz="1300" u="sng" spc="-1">
+              <a:rPr lang="en-US" sz="1300" u="sng" spc="-1" dirty="0">
                 <a:solidFill>
                   <a:srgbClr val="000000"/>
                 </a:solidFill>
@@ -627,166 +627,19 @@
               </a:rPr>
               <a:t>https://docs.microsoft.com/en-us/powershell/jea/session-configurations</a:t>
             </a:r>
-            <a:endParaRPr lang="en-US" sz="1300" spc="-1">
+            <a:endParaRPr lang="en-US" sz="1300" spc="-1" dirty="0">
               <a:latin typeface="Arial"/>
             </a:endParaRPr>
           </a:p>
           <a:p>
             <a:pPr marL="228334" indent="-226811"/>
-            <a:br/>
-            <a:r>
-              <a:rPr lang="en-US" sz="1300" spc="-1">
-                <a:solidFill>
-                  <a:srgbClr val="000000"/>
-                </a:solidFill>
-              </a:rPr>
-              <a:t>You can open the session configuration file in any text editor. The -SessionType RestrictedRemoteServer field indicates that the session configuration will be used by JEA for secure management. Sessions configured this way will operate in </a:t>
-            </a:r>
-            <a:r>
-              <a:rPr lang="en-US" sz="1300" u="sng" spc="-1">
-                <a:solidFill>
-                  <a:srgbClr val="000000"/>
-                </a:solidFill>
-                <a:hlinkClick r:id="rId4"/>
-              </a:rPr>
-              <a:t>NoLanguage mode</a:t>
-            </a:r>
-            <a:r>
-              <a:rPr lang="en-US" sz="1300" u="sng" spc="-1">
-                <a:solidFill>
-                  <a:srgbClr val="000000"/>
-                </a:solidFill>
-              </a:rPr>
-              <a:t> </a:t>
-            </a:r>
-            <a:r>
-              <a:rPr lang="en-US" sz="1300" spc="-1">
-                <a:solidFill>
-                  <a:srgbClr val="000000"/>
-                </a:solidFill>
-              </a:rPr>
-              <a:t>and only have the following 8 default commands (and aliases) available:</a:t>
-            </a:r>
-            <a:endParaRPr lang="en-US" sz="1300" spc="-1">
-              <a:latin typeface="Arial"/>
-            </a:endParaRPr>
-          </a:p>
-          <a:p>
-            <a:pPr marL="228334" indent="-226811"/>
-            <a:r>
-              <a:rPr lang="en-US" sz="1300" spc="-1">
-                <a:solidFill>
-                  <a:srgbClr val="000000"/>
-                </a:solidFill>
-              </a:rPr>
-              <a:t>Clear-Host (cls, clear)</a:t>
-            </a:r>
-            <a:endParaRPr lang="en-US" sz="1300" spc="-1">
-              <a:latin typeface="Arial"/>
-            </a:endParaRPr>
-          </a:p>
-          <a:p>
-            <a:pPr marL="228334" indent="-226811"/>
-            <a:r>
-              <a:rPr lang="en-US" sz="1300" spc="-1">
-                <a:solidFill>
-                  <a:srgbClr val="000000"/>
-                </a:solidFill>
-              </a:rPr>
-              <a:t>Exit-PSSession (exsn, exit)</a:t>
-            </a:r>
-            <a:endParaRPr lang="en-US" sz="1300" spc="-1">
-              <a:latin typeface="Arial"/>
-            </a:endParaRPr>
-          </a:p>
-          <a:p>
-            <a:pPr marL="228334" indent="-226811"/>
-            <a:r>
-              <a:rPr lang="en-US" sz="1300" spc="-1">
-                <a:solidFill>
-                  <a:srgbClr val="000000"/>
-                </a:solidFill>
-              </a:rPr>
-              <a:t>Get-Command (gcm)</a:t>
-            </a:r>
-            <a:endParaRPr lang="en-US" sz="1300" spc="-1">
-              <a:latin typeface="Arial"/>
-            </a:endParaRPr>
-          </a:p>
-          <a:p>
-            <a:pPr marL="228334" indent="-226811"/>
-            <a:r>
-              <a:rPr lang="en-US" sz="1300" spc="-1">
-                <a:solidFill>
-                  <a:srgbClr val="000000"/>
-                </a:solidFill>
-              </a:rPr>
-              <a:t>Get-FormatData</a:t>
-            </a:r>
-            <a:endParaRPr lang="en-US" sz="1300" spc="-1">
-              <a:latin typeface="Arial"/>
-            </a:endParaRPr>
-          </a:p>
-          <a:p>
-            <a:pPr marL="228334" indent="-226811"/>
-            <a:r>
-              <a:rPr lang="en-US" sz="1300" spc="-1">
-                <a:solidFill>
-                  <a:srgbClr val="000000"/>
-                </a:solidFill>
-              </a:rPr>
-              <a:t>Get-Help</a:t>
-            </a:r>
-            <a:endParaRPr lang="en-US" sz="1300" spc="-1">
-              <a:latin typeface="Arial"/>
-            </a:endParaRPr>
-          </a:p>
-          <a:p>
-            <a:pPr marL="228334" indent="-226811"/>
-            <a:r>
-              <a:rPr lang="en-US" sz="1300" spc="-1">
-                <a:solidFill>
-                  <a:srgbClr val="000000"/>
-                </a:solidFill>
-              </a:rPr>
-              <a:t>Measure-Object (measure)</a:t>
-            </a:r>
-            <a:endParaRPr lang="en-US" sz="1300" spc="-1">
-              <a:latin typeface="Arial"/>
-            </a:endParaRPr>
-          </a:p>
-          <a:p>
-            <a:pPr marL="228334" indent="-226811"/>
-            <a:r>
-              <a:rPr lang="en-US" sz="1300" spc="-1">
-                <a:solidFill>
-                  <a:srgbClr val="000000"/>
-                </a:solidFill>
-              </a:rPr>
-              <a:t>Out-Default</a:t>
-            </a:r>
-            <a:endParaRPr lang="en-US" sz="1300" spc="-1">
-              <a:latin typeface="Arial"/>
-            </a:endParaRPr>
-          </a:p>
-          <a:p>
-            <a:pPr marL="228334" indent="-226811"/>
-            <a:r>
-              <a:rPr lang="en-US" sz="1300" spc="-1">
-                <a:solidFill>
-                  <a:srgbClr val="000000"/>
-                </a:solidFill>
-              </a:rPr>
-              <a:t>Select-Object (select)</a:t>
-            </a:r>
-            <a:endParaRPr lang="en-US" sz="1300" spc="-1">
-              <a:latin typeface="Arial"/>
-            </a:endParaRPr>
-          </a:p>
-          <a:p>
-            <a:pPr marL="228334" indent="-226811"/>
-            <a:br/>
-            <a:endParaRPr lang="en-US" sz="1300" spc="-1">
+            <a:br>
+              <a:rPr dirty="0"/>
+            </a:br>
+            <a:br>
+              <a:rPr dirty="0"/>
+            </a:br>
+            <a:endParaRPr lang="en-US" sz="1300" spc="-1" dirty="0">
               <a:latin typeface="Arial"/>
             </a:endParaRPr>
           </a:p>
@@ -921,12 +774,282 @@
           <a:p>
             <a:pPr marL="228334" indent="-226811"/>
             <a:r>
+              <a:rPr lang="en-US" sz="1300" spc="-1" dirty="0">
+                <a:solidFill>
+                  <a:srgbClr val="000000"/>
+                </a:solidFill>
+              </a:rPr>
+              <a:t>https://docs.microsoft.com/en-us/powershell/jea/session-configurations</a:t>
+            </a:r>
+          </a:p>
+          <a:p>
+            <a:pPr marL="228334" indent="-226811"/>
+            <a:endParaRPr lang="en-US" sz="1300" spc="-1" dirty="0">
+              <a:solidFill>
+                <a:srgbClr val="000000"/>
+              </a:solidFill>
+              <a:latin typeface="Arial"/>
+            </a:endParaRPr>
+          </a:p>
+          <a:p>
+            <a:pPr marL="228334" indent="-226811"/>
+            <a:r>
+              <a:rPr lang="en-US" sz="1300" spc="-1" dirty="0">
+                <a:solidFill>
+                  <a:srgbClr val="000000"/>
+                </a:solidFill>
+              </a:rPr>
+              <a:t>You can open the session configuration file in any text editor. The -</a:t>
+            </a:r>
+            <a:r>
+              <a:rPr lang="en-US" sz="1300" spc="-1" dirty="0" err="1">
+                <a:solidFill>
+                  <a:srgbClr val="000000"/>
+                </a:solidFill>
+              </a:rPr>
+              <a:t>SessionType</a:t>
+            </a:r>
+            <a:r>
+              <a:rPr lang="en-US" sz="1300" spc="-1" dirty="0">
+                <a:solidFill>
+                  <a:srgbClr val="000000"/>
+                </a:solidFill>
+              </a:rPr>
+              <a:t> </a:t>
+            </a:r>
+            <a:r>
+              <a:rPr lang="en-US" sz="1300" spc="-1" dirty="0" err="1">
+                <a:solidFill>
+                  <a:srgbClr val="000000"/>
+                </a:solidFill>
+              </a:rPr>
+              <a:t>RestrictedRemoteServer</a:t>
+            </a:r>
+            <a:r>
+              <a:rPr lang="en-US" sz="1300" spc="-1" dirty="0">
+                <a:solidFill>
+                  <a:srgbClr val="000000"/>
+                </a:solidFill>
+              </a:rPr>
+              <a:t> field indicates that the session configuration will be used by JEA for secure management. Sessions configured this way will operate in </a:t>
+            </a:r>
+            <a:r>
+              <a:rPr lang="en-US" sz="1300" u="sng" spc="-1" dirty="0" err="1">
+                <a:solidFill>
+                  <a:srgbClr val="000000"/>
+                </a:solidFill>
+                <a:hlinkClick r:id="rId3"/>
+              </a:rPr>
+              <a:t>NoLanguage</a:t>
+            </a:r>
+            <a:r>
+              <a:rPr lang="en-US" sz="1300" u="sng" spc="-1" dirty="0">
+                <a:solidFill>
+                  <a:srgbClr val="000000"/>
+                </a:solidFill>
+                <a:hlinkClick r:id="rId3"/>
+              </a:rPr>
+              <a:t> mode</a:t>
+            </a:r>
+            <a:r>
+              <a:rPr lang="en-US" sz="1300" u="sng" spc="-1" dirty="0">
+                <a:solidFill>
+                  <a:srgbClr val="000000"/>
+                </a:solidFill>
+              </a:rPr>
+              <a:t> </a:t>
+            </a:r>
+            <a:r>
+              <a:rPr lang="en-US" sz="1300" spc="-1" dirty="0">
+                <a:solidFill>
+                  <a:srgbClr val="000000"/>
+                </a:solidFill>
+              </a:rPr>
+              <a:t>and only have the following 8 default commands (and aliases) available:</a:t>
+            </a:r>
+            <a:endParaRPr lang="en-US" sz="1300" spc="-1" dirty="0">
+              <a:latin typeface="Arial"/>
+            </a:endParaRPr>
+          </a:p>
+          <a:p>
+            <a:pPr marL="228334" indent="-226811"/>
+            <a:r>
+              <a:rPr lang="en-US" sz="1300" spc="-1" dirty="0">
+                <a:solidFill>
+                  <a:srgbClr val="000000"/>
+                </a:solidFill>
+              </a:rPr>
+              <a:t>Clear-Host (</a:t>
+            </a:r>
+            <a:r>
+              <a:rPr lang="en-US" sz="1300" spc="-1" dirty="0" err="1">
+                <a:solidFill>
+                  <a:srgbClr val="000000"/>
+                </a:solidFill>
+              </a:rPr>
+              <a:t>cls</a:t>
+            </a:r>
+            <a:r>
+              <a:rPr lang="en-US" sz="1300" spc="-1" dirty="0">
+                <a:solidFill>
+                  <a:srgbClr val="000000"/>
+                </a:solidFill>
+              </a:rPr>
+              <a:t>, clear)</a:t>
+            </a:r>
+            <a:endParaRPr lang="en-US" sz="1300" spc="-1" dirty="0">
+              <a:latin typeface="Arial"/>
+            </a:endParaRPr>
+          </a:p>
+          <a:p>
+            <a:pPr marL="228334" indent="-226811"/>
+            <a:r>
+              <a:rPr lang="en-US" sz="1300" spc="-1" dirty="0">
+                <a:solidFill>
+                  <a:srgbClr val="000000"/>
+                </a:solidFill>
+              </a:rPr>
+              <a:t>Exit-</a:t>
+            </a:r>
+            <a:r>
+              <a:rPr lang="en-US" sz="1300" spc="-1" dirty="0" err="1">
+                <a:solidFill>
+                  <a:srgbClr val="000000"/>
+                </a:solidFill>
+              </a:rPr>
+              <a:t>PSSession</a:t>
+            </a:r>
+            <a:r>
+              <a:rPr lang="en-US" sz="1300" spc="-1" dirty="0">
+                <a:solidFill>
+                  <a:srgbClr val="000000"/>
+                </a:solidFill>
+              </a:rPr>
+              <a:t> (</a:t>
+            </a:r>
+            <a:r>
+              <a:rPr lang="en-US" sz="1300" spc="-1" dirty="0" err="1">
+                <a:solidFill>
+                  <a:srgbClr val="000000"/>
+                </a:solidFill>
+              </a:rPr>
+              <a:t>exsn</a:t>
+            </a:r>
+            <a:r>
+              <a:rPr lang="en-US" sz="1300" spc="-1" dirty="0">
+                <a:solidFill>
+                  <a:srgbClr val="000000"/>
+                </a:solidFill>
+              </a:rPr>
+              <a:t>, exit)</a:t>
+            </a:r>
+            <a:endParaRPr lang="en-US" sz="1300" spc="-1" dirty="0">
+              <a:latin typeface="Arial"/>
+            </a:endParaRPr>
+          </a:p>
+          <a:p>
+            <a:pPr marL="228334" indent="-226811"/>
+            <a:r>
+              <a:rPr lang="en-US" sz="1300" spc="-1" dirty="0">
+                <a:solidFill>
+                  <a:srgbClr val="000000"/>
+                </a:solidFill>
+              </a:rPr>
+              <a:t>Get-Command (</a:t>
+            </a:r>
+            <a:r>
+              <a:rPr lang="en-US" sz="1300" spc="-1" dirty="0" err="1">
+                <a:solidFill>
+                  <a:srgbClr val="000000"/>
+                </a:solidFill>
+              </a:rPr>
+              <a:t>gcm</a:t>
+            </a:r>
+            <a:r>
+              <a:rPr lang="en-US" sz="1300" spc="-1" dirty="0">
+                <a:solidFill>
+                  <a:srgbClr val="000000"/>
+                </a:solidFill>
+              </a:rPr>
+              <a:t>)</a:t>
+            </a:r>
+            <a:endParaRPr lang="en-US" sz="1300" spc="-1" dirty="0">
+              <a:latin typeface="Arial"/>
+            </a:endParaRPr>
+          </a:p>
+          <a:p>
+            <a:pPr marL="228334" indent="-226811"/>
+            <a:r>
+              <a:rPr lang="en-US" sz="1300" spc="-1" dirty="0">
+                <a:solidFill>
+                  <a:srgbClr val="000000"/>
+                </a:solidFill>
+              </a:rPr>
+              <a:t>Get-</a:t>
+            </a:r>
+            <a:r>
+              <a:rPr lang="en-US" sz="1300" spc="-1" dirty="0" err="1">
+                <a:solidFill>
+                  <a:srgbClr val="000000"/>
+                </a:solidFill>
+              </a:rPr>
+              <a:t>FormatData</a:t>
+            </a:r>
+            <a:endParaRPr lang="en-US" sz="1300" spc="-1" dirty="0">
+              <a:latin typeface="Arial"/>
+            </a:endParaRPr>
+          </a:p>
+          <a:p>
+            <a:pPr marL="228334" indent="-226811"/>
+            <a:r>
+              <a:rPr lang="en-US" sz="1300" spc="-1" dirty="0">
+                <a:solidFill>
+                  <a:srgbClr val="000000"/>
+                </a:solidFill>
+              </a:rPr>
+              <a:t>Get-Help</a:t>
+            </a:r>
+            <a:endParaRPr lang="en-US" sz="1300" spc="-1" dirty="0">
+              <a:latin typeface="Arial"/>
+            </a:endParaRPr>
+          </a:p>
+          <a:p>
+            <a:pPr marL="228334" indent="-226811"/>
+            <a:r>
+              <a:rPr lang="en-US" sz="1300" spc="-1" dirty="0">
+                <a:solidFill>
+                  <a:srgbClr val="000000"/>
+                </a:solidFill>
+              </a:rPr>
+              <a:t>Measure-Object (measure)</a:t>
+            </a:r>
+            <a:endParaRPr lang="en-US" sz="1300" spc="-1" dirty="0">
+              <a:latin typeface="Arial"/>
+            </a:endParaRPr>
+          </a:p>
+          <a:p>
+            <a:pPr marL="228334" indent="-226811"/>
+            <a:r>
+              <a:rPr lang="en-US" sz="1300" spc="-1" dirty="0">
+                <a:solidFill>
+                  <a:srgbClr val="000000"/>
+                </a:solidFill>
+              </a:rPr>
+              <a:t>Out-Default</a:t>
+            </a:r>
+            <a:endParaRPr lang="en-US" sz="1300" spc="-1" dirty="0">
+              <a:latin typeface="Arial"/>
+            </a:endParaRPr>
+          </a:p>
+          <a:p>
+            <a:pPr marL="228334" indent="-226811"/>
+            <a:r>
               <a:rPr lang="en-US" sz="1300" spc="-1">
                 <a:solidFill>
                   <a:srgbClr val="000000"/>
                 </a:solidFill>
               </a:rPr>
-              <a:t>https://docs.microsoft.com/en-us/powershell/jea/session-configurations</a:t>
+              <a:t>Select-Object (select)</a:t>
             </a:r>
             <a:endParaRPr lang="en-US" sz="1300" spc="-1">
               <a:latin typeface="Arial"/>
@@ -935,6 +1058,12 @@
           <a:p>
             <a:pPr marL="228334" indent="-226811"/>
             <a:endParaRPr lang="en-US" sz="1300" spc="-1">
+              <a:latin typeface="Arial"/>
+            </a:endParaRPr>
+          </a:p>
+          <a:p>
+            <a:pPr marL="228334" indent="-226811"/>
+            <a:endParaRPr lang="en-US" sz="1300" spc="-1" dirty="0">
               <a:latin typeface="Arial"/>
             </a:endParaRPr>
           </a:p>
@@ -2734,7 +2863,7 @@
           <a:p>
             <a:fld id="{9E016143-E03C-4CFD-AFDC-14E5BDEA754C}" type="datetimeFigureOut">
               <a:rPr lang="en-US" smtClean="0"/>
-              <a:t>12/7/2020</a:t>
+              <a:t>12/15/2020</a:t>
             </a:fld>
             <a:endParaRPr lang="en-US" dirty="0"/>
           </a:p>
@@ -2959,7 +3088,7 @@
           <a:p>
             <a:fld id="{C033E54A-A8CA-48C1-9504-691B58049D29}" type="datetimeFigureOut">
               <a:rPr lang="en-US" smtClean="0"/>
-              <a:t>12/7/2020</a:t>
+              <a:t>12/15/2020</a:t>
             </a:fld>
             <a:endParaRPr lang="en-US" dirty="0"/>
           </a:p>
@@ -3139,7 +3268,7 @@
           <a:p>
             <a:fld id="{B5F6C806-BBF7-471C-9527-881CE2266695}" type="datetimeFigureOut">
               <a:rPr lang="en-US" smtClean="0"/>
-              <a:t>12/7/2020</a:t>
+              <a:t>12/15/2020</a:t>
             </a:fld>
             <a:endParaRPr lang="en-US" dirty="0"/>
           </a:p>
@@ -3309,7 +3438,7 @@
           <a:p>
             <a:fld id="{78C94063-DF36-4330-A365-08DA1FA5B7D6}" type="datetimeFigureOut">
               <a:rPr lang="en-US" smtClean="0"/>
-              <a:t>12/7/2020</a:t>
+              <a:t>12/15/2020</a:t>
             </a:fld>
             <a:endParaRPr lang="en-US" dirty="0"/>
           </a:p>
@@ -3600,7 +3729,7 @@
           <a:p>
             <a:fld id="{908A7C6C-0F39-4D70-8E8D-FE5B9C95FA73}" type="datetimeFigureOut">
               <a:rPr lang="en-US" smtClean="0"/>
-              <a:t>12/7/2020</a:t>
+              <a:t>12/15/2020</a:t>
             </a:fld>
             <a:endParaRPr lang="en-US" dirty="0"/>
           </a:p>
@@ -3926,7 +4055,7 @@
           <a:p>
             <a:fld id="{DFCFA4AC-08CC-42CE-BD01-C191750A04EC}" type="datetimeFigureOut">
               <a:rPr lang="en-US" smtClean="0"/>
-              <a:t>12/7/2020</a:t>
+              <a:t>12/15/2020</a:t>
             </a:fld>
             <a:endParaRPr lang="en-US" dirty="0"/>
           </a:p>
@@ -4338,7 +4467,7 @@
           <a:p>
             <a:fld id="{51CF1133-3259-4C45-BABA-5B62D9C6F78D}" type="datetimeFigureOut">
               <a:rPr lang="en-US" smtClean="0"/>
-              <a:t>12/7/2020</a:t>
+              <a:t>12/15/2020</a:t>
             </a:fld>
             <a:endParaRPr lang="en-US" dirty="0"/>
           </a:p>
@@ -4457,7 +4586,7 @@
           <a:p>
             <a:fld id="{4F170639-886C-4FCF-9EAB-ABB5DA3F3F4A}" type="datetimeFigureOut">
               <a:rPr lang="en-US" smtClean="0"/>
-              <a:t>12/7/2020</a:t>
+              <a:t>12/15/2020</a:t>
             </a:fld>
             <a:endParaRPr lang="en-US" dirty="0"/>
           </a:p>
@@ -4552,7 +4681,7 @@
           <a:p>
             <a:fld id="{22230651-31F4-45D2-98AE-A2108F41BC07}" type="datetimeFigureOut">
               <a:rPr lang="en-US" smtClean="0"/>
-              <a:t>12/7/2020</a:t>
+              <a:t>12/15/2020</a:t>
             </a:fld>
             <a:endParaRPr lang="en-US" dirty="0"/>
           </a:p>
@@ -4839,7 +4968,7 @@
           <a:p>
             <a:fld id="{6F53789A-C914-4DB1-8815-80B5EC7335C5}" type="datetimeFigureOut">
               <a:rPr lang="en-US" smtClean="0"/>
-              <a:t>12/7/2020</a:t>
+              <a:t>12/15/2020</a:t>
             </a:fld>
             <a:endParaRPr lang="en-US" dirty="0"/>
           </a:p>
@@ -5116,7 +5245,7 @@
           <a:p>
             <a:fld id="{5E6440AA-91A0-436F-8FDB-C0F939DCAE21}" type="datetimeFigureOut">
               <a:rPr lang="en-US" smtClean="0"/>
-              <a:t>12/7/2020</a:t>
+              <a:t>12/15/2020</a:t>
             </a:fld>
             <a:endParaRPr lang="en-US" dirty="0"/>
           </a:p>
@@ -5367,7 +5496,7 @@
           <a:p>
             <a:fld id="{51CF1133-3259-4C45-BABA-5B62D9C6F78D}" type="datetimeFigureOut">
               <a:rPr lang="en-US" smtClean="0"/>
-              <a:t>12/7/2020</a:t>
+              <a:t>12/15/2020</a:t>
             </a:fld>
             <a:endParaRPr lang="en-US" dirty="0"/>
           </a:p>
@@ -10947,7 +11076,12 @@
             <p:ph idx="1"/>
           </p:nvPr>
         </p:nvSpPr>
-        <p:spPr/>
+        <p:spPr>
+          <a:xfrm>
+            <a:off x="5514679" y="685800"/>
+            <a:ext cx="5068653" cy="5486400"/>
+          </a:xfrm>
+        </p:spPr>
         <p:txBody>
           <a:bodyPr/>
           <a:lstStyle/>
@@ -11026,7 +11160,76 @@
                   </a:schemeClr>
                 </a:solidFill>
               </a:rPr>
-              <a:t>SANs Mentor (GMON/SEC511, GCWN/SEC505)</a:t>
+              <a:t>Instructor</a:t>
+            </a:r>
+          </a:p>
+          <a:p>
+            <a:pPr marL="502920" lvl="1" indent="-228600">
+              <a:spcBef>
+                <a:spcPts val="1400"/>
+              </a:spcBef>
+              <a:buClr>
+                <a:srgbClr val="A5B592"/>
+              </a:buClr>
+              <a:buSzPct val="80000"/>
+              <a:buFont typeface="Arial" panose="020B0604020202020204" pitchFamily="34" charset="0"/>
+              <a:buChar char="•"/>
+            </a:pPr>
+            <a:r>
+              <a:rPr lang="en-US" sz="2200" b="0" strike="noStrike" spc="-1" dirty="0">
+                <a:solidFill>
+                  <a:schemeClr val="tx1">
+                    <a:lumMod val="95000"/>
+                  </a:schemeClr>
+                </a:solidFill>
+              </a:rPr>
+              <a:t>SANs Mentor/Community</a:t>
+            </a:r>
+          </a:p>
+          <a:p>
+            <a:pPr marL="502920" lvl="1" indent="-228600">
+              <a:spcBef>
+                <a:spcPts val="1400"/>
+              </a:spcBef>
+              <a:buClr>
+                <a:srgbClr val="A5B592"/>
+              </a:buClr>
+              <a:buSzPct val="80000"/>
+              <a:buFont typeface="Arial" panose="020B0604020202020204" pitchFamily="34" charset="0"/>
+              <a:buChar char="•"/>
+            </a:pPr>
+            <a:r>
+              <a:rPr lang="en-US" sz="2200" spc="-1" dirty="0">
+                <a:solidFill>
+                  <a:schemeClr val="tx1">
+                    <a:lumMod val="95000"/>
+                  </a:schemeClr>
+                </a:solidFill>
+              </a:rPr>
+              <a:t>Trilogy TA</a:t>
+            </a:r>
+          </a:p>
+          <a:p>
+            <a:pPr marL="502920" lvl="1" indent="-228600">
+              <a:spcBef>
+                <a:spcPts val="1400"/>
+              </a:spcBef>
+              <a:buClr>
+                <a:srgbClr val="A5B592"/>
+              </a:buClr>
+              <a:buSzPct val="80000"/>
+              <a:buFont typeface="Arial" panose="020B0604020202020204" pitchFamily="34" charset="0"/>
+              <a:buChar char="•"/>
+            </a:pPr>
+            <a:r>
+              <a:rPr lang="en-US" sz="2200" b="0" strike="noStrike" spc="-1" dirty="0">
+                <a:solidFill>
+                  <a:schemeClr val="tx1">
+                    <a:lumMod val="95000"/>
+                  </a:schemeClr>
+                </a:solidFill>
+              </a:rPr>
+              <a:t>Howard Community College</a:t>
             </a:r>
           </a:p>
           <a:p>
@@ -11099,7 +11302,12 @@
             <p:ph type="body" sz="half" idx="2"/>
           </p:nvPr>
         </p:nvSpPr>
-        <p:spPr/>
+        <p:spPr>
+          <a:xfrm>
+            <a:off x="841247" y="2099734"/>
+            <a:ext cx="4390629" cy="3810001"/>
+          </a:xfrm>
+        </p:spPr>
         <p:txBody>
           <a:bodyPr>
             <a:normAutofit/>
@@ -11400,8 +11608,16 @@
               <a:buChar char=""/>
             </a:pPr>
             <a:r>
-              <a:rPr lang="en-US" sz="2000" b="0" strike="noStrike" spc="-1"/>
-              <a:t>You work in small shop with 3 systems administrators.  You IT shop has a development team of 5 people and there is a contractor who is the system owner of one server.  Your development team has full admin rights to the database and web servers  The SysAdmins still update and patch the database and web servers, the developers just need admin rights for development. </a:t>
+              <a:rPr lang="en-US" sz="2000" b="0" strike="noStrike" spc="-1" dirty="0"/>
+              <a:t>You work in small shop with 3 systems administrators.  You IT shop has a development team of 5 people and there is a contractor who is the system owner of one server.  Your development team has full admin rights to the database and web servers  The </a:t>
+            </a:r>
+            <a:r>
+              <a:rPr lang="en-US" sz="2000" b="0" strike="noStrike" spc="-1" dirty="0" err="1"/>
+              <a:t>SysAdmins</a:t>
+            </a:r>
+            <a:r>
+              <a:rPr lang="en-US" sz="2000" b="0" strike="noStrike" spc="-1" dirty="0"/>
+              <a:t> still update and patch the database and web servers, the developers just need admin rights for development. </a:t>
             </a:r>
           </a:p>
           <a:p>
@@ -11420,8 +11636,8 @@
               <a:buChar char=""/>
             </a:pPr>
             <a:r>
-              <a:rPr lang="en-US" sz="2000" b="0" strike="noStrike" spc="-1"/>
-              <a:t>The contractor remotes into his server to operate and manage the thermostats for the organization.  He is just a user on the server and cannot perform any admin functions, to include restarting the machine.  He likes to leave his office and drive 10-15 miles to the sysadmin to perform maintances and reboot the machine.</a:t>
+              <a:rPr lang="en-US" sz="2000" b="0" strike="noStrike" spc="-1" dirty="0"/>
+              <a:t>The contractor remotes into his server to operate and manage the thermostats for the organization.  He is just a user on the server and cannot perform any admin functions, to include restarting the machine.  He likes to leave his office and drive 10-15 miles to visit the sysadmin and have them perform maintenance and reboot the machine.</a:t>
             </a:r>
           </a:p>
         </p:txBody>

</xml_diff>